<commit_message>
finished module00; some old files deleted
</commit_message>
<xml_diff>
--- a/Slides/Lesson 0.2 How to Learn in This Course.pptx
+++ b/Slides/Lesson 0.2 How to Learn in This Course.pptx
@@ -5,7 +5,7 @@
     <p:sldMasterId id="2147483660" r:id="rId1"/>
   </p:sldMasterIdLst>
   <p:notesMasterIdLst>
-    <p:notesMasterId r:id="rId19"/>
+    <p:notesMasterId r:id="rId18"/>
   </p:notesMasterIdLst>
   <p:sldIdLst>
     <p:sldId id="257" r:id="rId2"/>
@@ -22,9 +22,8 @@
     <p:sldId id="267" r:id="rId13"/>
     <p:sldId id="268" r:id="rId14"/>
     <p:sldId id="271" r:id="rId15"/>
-    <p:sldId id="270" r:id="rId16"/>
-    <p:sldId id="272" r:id="rId17"/>
-    <p:sldId id="273" r:id="rId18"/>
+    <p:sldId id="272" r:id="rId16"/>
+    <p:sldId id="273" r:id="rId17"/>
   </p:sldIdLst>
   <p:sldSz cx="9144000" cy="6858000" type="screen4x3"/>
   <p:notesSz cx="6858000" cy="9144000"/>
@@ -224,7 +223,7 @@
           <a:p>
             <a:fld id="{FF5194DA-5B46-4C21-B973-C13D42985E34}" type="datetimeFigureOut">
               <a:rPr lang="en-US" smtClean="0"/>
-              <a:t>1/20/2017</a:t>
+              <a:t>7/23/2017</a:t>
             </a:fld>
             <a:endParaRPr lang="en-US"/>
           </a:p>
@@ -797,7 +796,7 @@
                   </a:prstClr>
                 </a:solidFill>
               </a:rPr>
-              <a:t>1/20/2017</a:t>
+              <a:t>7/23/2017</a:t>
             </a:fld>
             <a:endParaRPr lang="en-US">
               <a:solidFill>
@@ -1080,7 +1079,7 @@
                   </a:prstClr>
                 </a:solidFill>
               </a:rPr>
-              <a:t>1/20/2017</a:t>
+              <a:t>7/23/2017</a:t>
             </a:fld>
             <a:endParaRPr lang="en-US">
               <a:solidFill>
@@ -1279,7 +1278,7 @@
                   </a:prstClr>
                 </a:solidFill>
               </a:rPr>
-              <a:t>1/20/2017</a:t>
+              <a:t>7/23/2017</a:t>
             </a:fld>
             <a:endParaRPr lang="en-US">
               <a:solidFill>
@@ -1488,7 +1487,7 @@
                   </a:prstClr>
                 </a:solidFill>
               </a:rPr>
-              <a:t>1/20/2017</a:t>
+              <a:t>7/23/2017</a:t>
             </a:fld>
             <a:endParaRPr lang="en-US">
               <a:solidFill>
@@ -1693,7 +1692,7 @@
                   </a:prstClr>
                 </a:solidFill>
               </a:rPr>
-              <a:t>1/20/2017</a:t>
+              <a:t>7/23/2017</a:t>
             </a:fld>
             <a:endParaRPr lang="en-US" dirty="0">
               <a:solidFill>
@@ -1841,7 +1840,7 @@
                   </a:prstClr>
                 </a:solidFill>
               </a:rPr>
-              <a:t>1/20/2017</a:t>
+              <a:t>7/23/2017</a:t>
             </a:fld>
             <a:endParaRPr lang="en-US">
               <a:solidFill>
@@ -2117,7 +2116,7 @@
                   </a:prstClr>
                 </a:solidFill>
               </a:rPr>
-              <a:t>1/20/2017</a:t>
+              <a:t>7/23/2017</a:t>
             </a:fld>
             <a:endParaRPr lang="en-US">
               <a:solidFill>
@@ -2433,7 +2432,7 @@
                   </a:prstClr>
                 </a:solidFill>
               </a:rPr>
-              <a:t>1/20/2017</a:t>
+              <a:t>7/23/2017</a:t>
             </a:fld>
             <a:endParaRPr lang="en-US">
               <a:solidFill>
@@ -2883,7 +2882,7 @@
                   </a:prstClr>
                 </a:solidFill>
               </a:rPr>
-              <a:t>1/20/2017</a:t>
+              <a:t>7/23/2017</a:t>
             </a:fld>
             <a:endParaRPr lang="en-US">
               <a:solidFill>
@@ -3031,7 +3030,7 @@
                   </a:prstClr>
                 </a:solidFill>
               </a:rPr>
-              <a:t>1/20/2017</a:t>
+              <a:t>7/23/2017</a:t>
             </a:fld>
             <a:endParaRPr lang="en-US">
               <a:solidFill>
@@ -3157,7 +3156,7 @@
                   </a:prstClr>
                 </a:solidFill>
               </a:rPr>
-              <a:t>1/20/2017</a:t>
+              <a:t>7/23/2017</a:t>
             </a:fld>
             <a:endParaRPr lang="en-US">
               <a:solidFill>
@@ -3463,7 +3462,7 @@
                   </a:prstClr>
                 </a:solidFill>
               </a:rPr>
-              <a:t>1/20/2017</a:t>
+              <a:t>7/23/2017</a:t>
             </a:fld>
             <a:endParaRPr lang="en-US">
               <a:solidFill>
@@ -3705,7 +3704,7 @@
                   </a:prstClr>
                 </a:solidFill>
               </a:rPr>
-              <a:t>1/20/2017</a:t>
+              <a:t>7/23/2017</a:t>
             </a:fld>
             <a:endParaRPr lang="en-US">
               <a:solidFill>
@@ -4147,7 +4146,12 @@
             <p:ph type="subTitle" idx="1"/>
           </p:nvPr>
         </p:nvSpPr>
-        <p:spPr/>
+        <p:spPr>
+          <a:xfrm>
+            <a:off x="1371600" y="3930444"/>
+            <a:ext cx="6400800" cy="1752600"/>
+          </a:xfrm>
+        </p:spPr>
         <p:txBody>
           <a:bodyPr/>
           <a:lstStyle/>
@@ -4233,8 +4237,13 @@
             <a:p>
               <a:r>
                 <a:rPr lang="en-US" sz="1000" dirty="0"/>
-                <a:t>© Mitchell Wand, 2012-2015</a:t>
+                <a:t>© Mitchell Wand</a:t>
               </a:r>
+              <a:r>
+                <a:rPr lang="en-US" sz="1000"/>
+                <a:t>, 2012-2017</a:t>
+              </a:r>
+              <a:endParaRPr lang="en-US" sz="1000" dirty="0"/>
             </a:p>
             <a:p>
               <a:r>
@@ -4806,7 +4815,7 @@
             </a:r>
             <a:r>
               <a:rPr lang="en-US" dirty="0"/>
-              <a:t> in groups of 4 students.</a:t>
+              <a:t> in groups of about 4 students.</a:t>
             </a:r>
           </a:p>
           <a:p>
@@ -4926,39 +4935,40 @@
         <p:spPr/>
         <p:txBody>
           <a:bodyPr>
-            <a:normAutofit/>
+            <a:normAutofit fontScale="92500" lnSpcReduction="10000"/>
           </a:bodyPr>
           <a:lstStyle/>
           <a:p>
             <a:r>
               <a:rPr lang="en-US" dirty="0"/>
-              <a:t>Your solution will be graded using a detailed rubric</a:t>
+              <a:t>Your solution will be graded on its</a:t>
             </a:r>
           </a:p>
           <a:p>
             <a:pPr lvl="1"/>
             <a:r>
               <a:rPr lang="en-US" dirty="0"/>
-              <a:t>It's on the website– go read it.</a:t>
-            </a:r>
-          </a:p>
-          <a:p>
-            <a:r>
-              <a:rPr lang="en-US" dirty="0"/>
-              <a:t>You will be judged on </a:t>
+              <a:t>Correctness</a:t>
             </a:r>
           </a:p>
           <a:p>
             <a:pPr lvl="1"/>
             <a:r>
               <a:rPr lang="en-US" dirty="0"/>
-              <a:t>adherence to coding &amp; documentation standards</a:t>
+              <a:t>Quality of design</a:t>
             </a:r>
           </a:p>
           <a:p>
             <a:pPr lvl="1"/>
             <a:r>
               <a:rPr lang="en-US" dirty="0"/>
+              <a:t>Adherence to our coding and documentation standards</a:t>
+            </a:r>
+          </a:p>
+          <a:p>
+            <a:pPr lvl="1"/>
+            <a:r>
+              <a:rPr lang="en-US" dirty="0"/>
               <a:t>appropriate use of tools &amp; techniques</a:t>
             </a:r>
           </a:p>
@@ -4966,7 +4976,13 @@
             <a:pPr lvl="1"/>
             <a:r>
               <a:rPr lang="en-US" dirty="0"/>
-              <a:t>your ability to explain your program and your design decisions 	</a:t>
+              <a:t>your ability to explain your program and your design decisions</a:t>
+            </a:r>
+          </a:p>
+          <a:p>
+            <a:r>
+              <a:rPr lang="en-US" dirty="0"/>
+              <a:t>The details, including a description of our grading scale, is on the web site.  Go read it! 	</a:t>
             </a:r>
           </a:p>
           <a:p>
@@ -5060,7 +5076,7 @@
           <a:p>
             <a:r>
               <a:rPr lang="en-US" dirty="0"/>
-              <a:t>Individual vs. Pair Work</a:t>
+              <a:t>Summary</a:t>
             </a:r>
           </a:p>
         </p:txBody>
@@ -5082,26 +5098,47 @@
           <a:p>
             <a:r>
               <a:rPr lang="en-US" dirty="0"/>
-              <a:t>The first 4 problem sets will be done individually</a:t>
-            </a:r>
-          </a:p>
-          <a:p>
-            <a:r>
-              <a:rPr lang="en-US" dirty="0"/>
-              <a:t>After that you will work in pairs.</a:t>
-            </a:r>
-          </a:p>
-          <a:p>
-            <a:r>
-              <a:rPr lang="en-US" dirty="0"/>
-              <a:t>We will assign the pairs.</a:t>
-            </a:r>
-          </a:p>
-          <a:p>
-            <a:r>
-              <a:rPr lang="en-US" dirty="0"/>
-              <a:t>There's lots more to be said about working in pairs– see the web site for more</a:t>
-            </a:r>
+              <a:t>You should now be able to</a:t>
+            </a:r>
+          </a:p>
+          <a:p>
+            <a:pPr lvl="1"/>
+            <a:r>
+              <a:rPr lang="en-US" dirty="0"/>
+              <a:t>explain how the "flipped classroom" model works</a:t>
+            </a:r>
+          </a:p>
+          <a:p>
+            <a:pPr lvl="1"/>
+            <a:r>
+              <a:rPr lang="en-US" dirty="0"/>
+              <a:t>understand how each module is organized</a:t>
+            </a:r>
+          </a:p>
+          <a:p>
+            <a:pPr lvl="1"/>
+            <a:r>
+              <a:rPr lang="en-US" dirty="0"/>
+              <a:t>explain how to find your learning objectives for each lesson</a:t>
+            </a:r>
+          </a:p>
+          <a:p>
+            <a:pPr lvl="1"/>
+            <a:r>
+              <a:rPr lang="en-US" dirty="0"/>
+              <a:t>understand how </a:t>
+            </a:r>
+            <a:r>
+              <a:rPr lang="en-US" dirty="0" err="1"/>
+              <a:t>homeworks</a:t>
+            </a:r>
+            <a:r>
+              <a:rPr lang="en-US" dirty="0"/>
+              <a:t> are assigned and graded</a:t>
+            </a:r>
+          </a:p>
+          <a:p>
+            <a:endParaRPr lang="en-US" dirty="0"/>
           </a:p>
         </p:txBody>
       </p:sp>
@@ -5144,7 +5181,7 @@
     </p:spTree>
     <p:extLst>
       <p:ext uri="{BB962C8B-B14F-4D97-AF65-F5344CB8AC3E}">
-        <p14:creationId xmlns:p14="http://schemas.microsoft.com/office/powerpoint/2010/main" val="981570442"/>
+        <p14:creationId xmlns:p14="http://schemas.microsoft.com/office/powerpoint/2010/main" val="2546463255"/>
       </p:ext>
     </p:extLst>
   </p:cSld>
@@ -5188,7 +5225,7 @@
           <a:p>
             <a:r>
               <a:rPr lang="en-US" dirty="0"/>
-              <a:t>Summary</a:t>
+              <a:t>Next Steps</a:t>
             </a:r>
           </a:p>
         </p:txBody>
@@ -5210,47 +5247,14 @@
           <a:p>
             <a:r>
               <a:rPr lang="en-US" dirty="0"/>
-              <a:t>You should now be able to</a:t>
-            </a:r>
-          </a:p>
-          <a:p>
-            <a:pPr lvl="1"/>
-            <a:r>
-              <a:rPr lang="en-US" dirty="0"/>
-              <a:t>explain how the "flipped classroom" model works</a:t>
-            </a:r>
-          </a:p>
-          <a:p>
-            <a:pPr lvl="1"/>
-            <a:r>
-              <a:rPr lang="en-US" dirty="0"/>
-              <a:t>understand how each module is organized</a:t>
-            </a:r>
-          </a:p>
-          <a:p>
-            <a:pPr lvl="1"/>
-            <a:r>
-              <a:rPr lang="en-US" dirty="0"/>
-              <a:t>explain how to find your learning objectives for each lesson</a:t>
-            </a:r>
-          </a:p>
-          <a:p>
-            <a:pPr lvl="1"/>
-            <a:r>
-              <a:rPr lang="en-US" dirty="0"/>
-              <a:t>understand how </a:t>
-            </a:r>
-            <a:r>
-              <a:rPr lang="en-US" dirty="0" err="1"/>
-              <a:t>homeworks</a:t>
-            </a:r>
-            <a:r>
-              <a:rPr lang="en-US" dirty="0"/>
-              <a:t> are assigned and graded</a:t>
-            </a:r>
-          </a:p>
-          <a:p>
-            <a:endParaRPr lang="en-US" dirty="0"/>
+              <a:t>If you have questions about this lesson, ask them on Piazza</a:t>
+            </a:r>
+          </a:p>
+          <a:p>
+            <a:r>
+              <a:rPr lang="en-US" dirty="0"/>
+              <a:t>Go on to the next lesson</a:t>
+            </a:r>
           </a:p>
         </p:txBody>
       </p:sp>
@@ -5279,122 +5283,6 @@
               </a:rPr>
               <a:pPr/>
               <a:t>16</a:t>
-            </a:fld>
-            <a:endParaRPr lang="en-US" dirty="0">
-              <a:solidFill>
-                <a:prstClr val="black">
-                  <a:tint val="75000"/>
-                </a:prstClr>
-              </a:solidFill>
-            </a:endParaRPr>
-          </a:p>
-        </p:txBody>
-      </p:sp>
-    </p:spTree>
-    <p:extLst>
-      <p:ext uri="{BB962C8B-B14F-4D97-AF65-F5344CB8AC3E}">
-        <p14:creationId xmlns:p14="http://schemas.microsoft.com/office/powerpoint/2010/main" val="2546463255"/>
-      </p:ext>
-    </p:extLst>
-  </p:cSld>
-  <p:clrMapOvr>
-    <a:masterClrMapping/>
-  </p:clrMapOvr>
-</p:sld>
-</file>
-
-<file path=ppt/slides/slide17.xml><?xml version="1.0" encoding="utf-8"?>
-<p:sld xmlns:a="http://schemas.openxmlformats.org/drawingml/2006/main" xmlns:r="http://schemas.openxmlformats.org/officeDocument/2006/relationships" xmlns:p="http://schemas.openxmlformats.org/presentationml/2006/main">
-  <p:cSld>
-    <p:spTree>
-      <p:nvGrpSpPr>
-        <p:cNvPr id="1" name=""/>
-        <p:cNvGrpSpPr/>
-        <p:nvPr/>
-      </p:nvGrpSpPr>
-      <p:grpSpPr>
-        <a:xfrm>
-          <a:off x="0" y="0"/>
-          <a:ext cx="0" cy="0"/>
-          <a:chOff x="0" y="0"/>
-          <a:chExt cx="0" cy="0"/>
-        </a:xfrm>
-      </p:grpSpPr>
-      <p:sp>
-        <p:nvSpPr>
-          <p:cNvPr id="2" name="Title 1"/>
-          <p:cNvSpPr>
-            <a:spLocks noGrp="1"/>
-          </p:cNvSpPr>
-          <p:nvPr>
-            <p:ph type="title"/>
-          </p:nvPr>
-        </p:nvSpPr>
-        <p:spPr/>
-        <p:txBody>
-          <a:bodyPr/>
-          <a:lstStyle/>
-          <a:p>
-            <a:r>
-              <a:rPr lang="en-US" dirty="0"/>
-              <a:t>Next Steps</a:t>
-            </a:r>
-          </a:p>
-        </p:txBody>
-      </p:sp>
-      <p:sp>
-        <p:nvSpPr>
-          <p:cNvPr id="3" name="Content Placeholder 2"/>
-          <p:cNvSpPr>
-            <a:spLocks noGrp="1"/>
-          </p:cNvSpPr>
-          <p:nvPr>
-            <p:ph idx="1"/>
-          </p:nvPr>
-        </p:nvSpPr>
-        <p:spPr/>
-        <p:txBody>
-          <a:bodyPr/>
-          <a:lstStyle/>
-          <a:p>
-            <a:r>
-              <a:rPr lang="en-US" dirty="0"/>
-              <a:t>If you have questions about this lesson, ask them on Piazza</a:t>
-            </a:r>
-          </a:p>
-          <a:p>
-            <a:r>
-              <a:rPr lang="en-US" dirty="0"/>
-              <a:t>Go on to the next lesson</a:t>
-            </a:r>
-          </a:p>
-        </p:txBody>
-      </p:sp>
-      <p:sp>
-        <p:nvSpPr>
-          <p:cNvPr id="4" name="Slide Number Placeholder 3"/>
-          <p:cNvSpPr>
-            <a:spLocks noGrp="1"/>
-          </p:cNvSpPr>
-          <p:nvPr>
-            <p:ph type="sldNum" sz="quarter" idx="12"/>
-          </p:nvPr>
-        </p:nvSpPr>
-        <p:spPr/>
-        <p:txBody>
-          <a:bodyPr/>
-          <a:lstStyle/>
-          <a:p>
-            <a:fld id="{B6F15528-21DE-4FAA-801E-634DDDAF4B2B}" type="slidenum">
-              <a:rPr lang="en-US" smtClean="0">
-                <a:solidFill>
-                  <a:prstClr val="black">
-                    <a:tint val="75000"/>
-                  </a:prstClr>
-                </a:solidFill>
-              </a:rPr>
-              <a:pPr/>
-              <a:t>17</a:t>
             </a:fld>
             <a:endParaRPr lang="en-US" dirty="0">
               <a:solidFill>
@@ -6163,7 +6051,9 @@
             </a:schemeClr>
           </a:solidFill>
           <a:ln>
-            <a:noFill/>
+            <a:solidFill>
+              <a:schemeClr val="accent1"/>
+            </a:solidFill>
           </a:ln>
         </p:spPr>
         <p:style>
@@ -6799,15 +6689,13 @@
               <a:rPr lang="en-US" dirty="0"/>
               <a:t>you can ask the instructor questions, but the instructor may ask you questions also.</a:t>
             </a:r>
-          </a:p>
-          <a:p>
             <a:r>
               <a:rPr lang="en-US" b="1" i="1" dirty="0">
                 <a:solidFill>
                   <a:srgbClr val="FF0000"/>
                 </a:solidFill>
               </a:rPr>
-              <a:t>No new material will be presented in class. </a:t>
+              <a:t> </a:t>
             </a:r>
           </a:p>
         </p:txBody>

</xml_diff>

<commit_message>
fixed error in L0.2 re codewalk scheduling
</commit_message>
<xml_diff>
--- a/Slides/Lesson 0.2 How to Learn in This Course.pptx
+++ b/Slides/Lesson 0.2 How to Learn in This Course.pptx
@@ -223,7 +223,7 @@
           <a:p>
             <a:fld id="{FF5194DA-5B46-4C21-B973-C13D42985E34}" type="datetimeFigureOut">
               <a:rPr lang="en-US" smtClean="0"/>
-              <a:t>8/11/2017</a:t>
+              <a:t>9/11/2017</a:t>
             </a:fld>
             <a:endParaRPr lang="en-US"/>
           </a:p>
@@ -796,7 +796,7 @@
                   </a:prstClr>
                 </a:solidFill>
               </a:rPr>
-              <a:t>8/11/2017</a:t>
+              <a:t>9/11/2017</a:t>
             </a:fld>
             <a:endParaRPr lang="en-US">
               <a:solidFill>
@@ -1079,7 +1079,7 @@
                   </a:prstClr>
                 </a:solidFill>
               </a:rPr>
-              <a:t>8/11/2017</a:t>
+              <a:t>9/11/2017</a:t>
             </a:fld>
             <a:endParaRPr lang="en-US">
               <a:solidFill>
@@ -1278,7 +1278,7 @@
                   </a:prstClr>
                 </a:solidFill>
               </a:rPr>
-              <a:t>8/11/2017</a:t>
+              <a:t>9/11/2017</a:t>
             </a:fld>
             <a:endParaRPr lang="en-US">
               <a:solidFill>
@@ -1487,7 +1487,7 @@
                   </a:prstClr>
                 </a:solidFill>
               </a:rPr>
-              <a:t>8/11/2017</a:t>
+              <a:t>9/11/2017</a:t>
             </a:fld>
             <a:endParaRPr lang="en-US">
               <a:solidFill>
@@ -1692,7 +1692,7 @@
                   </a:prstClr>
                 </a:solidFill>
               </a:rPr>
-              <a:t>8/11/2017</a:t>
+              <a:t>9/11/2017</a:t>
             </a:fld>
             <a:endParaRPr lang="en-US" dirty="0">
               <a:solidFill>
@@ -1840,7 +1840,7 @@
                   </a:prstClr>
                 </a:solidFill>
               </a:rPr>
-              <a:t>8/11/2017</a:t>
+              <a:t>9/11/2017</a:t>
             </a:fld>
             <a:endParaRPr lang="en-US">
               <a:solidFill>
@@ -2116,7 +2116,7 @@
                   </a:prstClr>
                 </a:solidFill>
               </a:rPr>
-              <a:t>8/11/2017</a:t>
+              <a:t>9/11/2017</a:t>
             </a:fld>
             <a:endParaRPr lang="en-US">
               <a:solidFill>
@@ -2432,7 +2432,7 @@
                   </a:prstClr>
                 </a:solidFill>
               </a:rPr>
-              <a:t>8/11/2017</a:t>
+              <a:t>9/11/2017</a:t>
             </a:fld>
             <a:endParaRPr lang="en-US">
               <a:solidFill>
@@ -2882,7 +2882,7 @@
                   </a:prstClr>
                 </a:solidFill>
               </a:rPr>
-              <a:t>8/11/2017</a:t>
+              <a:t>9/11/2017</a:t>
             </a:fld>
             <a:endParaRPr lang="en-US">
               <a:solidFill>
@@ -3030,7 +3030,7 @@
                   </a:prstClr>
                 </a:solidFill>
               </a:rPr>
-              <a:t>8/11/2017</a:t>
+              <a:t>9/11/2017</a:t>
             </a:fld>
             <a:endParaRPr lang="en-US">
               <a:solidFill>
@@ -3156,7 +3156,7 @@
                   </a:prstClr>
                 </a:solidFill>
               </a:rPr>
-              <a:t>8/11/2017</a:t>
+              <a:t>9/11/2017</a:t>
             </a:fld>
             <a:endParaRPr lang="en-US">
               <a:solidFill>
@@ -3462,7 +3462,7 @@
                   </a:prstClr>
                 </a:solidFill>
               </a:rPr>
-              <a:t>8/11/2017</a:t>
+              <a:t>9/11/2017</a:t>
             </a:fld>
             <a:endParaRPr lang="en-US">
               <a:solidFill>
@@ -3704,7 +3704,7 @@
                   </a:prstClr>
                 </a:solidFill>
               </a:rPr>
-              <a:t>8/11/2017</a:t>
+              <a:t>9/11/2017</a:t>
             </a:fld>
             <a:endParaRPr lang="en-US">
               <a:solidFill>
@@ -4775,7 +4775,7 @@
         <p:spPr/>
         <p:txBody>
           <a:bodyPr>
-            <a:normAutofit fontScale="92500" lnSpcReduction="10000"/>
+            <a:normAutofit fontScale="92500" lnSpcReduction="20000"/>
           </a:bodyPr>
           <a:lstStyle/>
           <a:p>
@@ -4821,16 +4821,24 @@
           <a:p>
             <a:r>
               <a:rPr lang="en-US" dirty="0"/>
-              <a:t>You will sign up for a </a:t>
+              <a:t>We will ask you to state your preferences for the scheduling of your </a:t>
             </a:r>
             <a:r>
               <a:rPr lang="en-US" dirty="0" err="1"/>
-              <a:t>codewalk</a:t>
-            </a:r>
-            <a:r>
-              <a:rPr lang="en-US" dirty="0"/>
-              <a:t> slot using a personalized URL that you will receive</a:t>
-            </a:r>
+              <a:t>codewalks</a:t>
+            </a:r>
+            <a:r>
+              <a:rPr lang="en-US" dirty="0"/>
+              <a:t>.  The mechanism for doing this will </a:t>
+            </a:r>
+            <a:r>
+              <a:rPr lang="en-US"/>
+              <a:t>be announced later.</a:t>
+            </a:r>
+            <a:endParaRPr lang="en-US" dirty="0"/>
+          </a:p>
+          <a:p>
+            <a:endParaRPr lang="en-US" dirty="0"/>
           </a:p>
         </p:txBody>
       </p:sp>

</xml_diff>